<commit_message>
Added comments and TODOs
</commit_message>
<xml_diff>
--- a/Courses/Software-Sciences/Module-4-Information-Systems-New/03-Introduction-to-ORM/03-Introduction-to-ORM.pptx
+++ b/Courses/Software-Sciences/Module-4-Information-Systems-New/03-Introduction-to-ORM/03-Introduction-to-ORM.pptx
@@ -24173,6 +24173,109 @@
           </a:ln>
         </p:spPr>
       </p:pic>
+      <p:sp>
+        <p:nvSpPr>
+          <p:cNvPr id="2" name="Rectangle: Rounded Corners 1">
+            <a:extLst>
+              <a:ext uri="{FF2B5EF4-FFF2-40B4-BE49-F238E27FC236}">
+                <a16:creationId xmlns:a16="http://schemas.microsoft.com/office/drawing/2014/main" id="{293C029D-C9FE-F5F7-0145-4B96CD733B6B}"/>
+              </a:ext>
+            </a:extLst>
+          </p:cNvPr>
+          <p:cNvSpPr/>
+          <p:nvPr/>
+        </p:nvSpPr>
+        <p:spPr bwMode="auto">
+          <a:xfrm>
+            <a:off x="6897113" y="3700577"/>
+            <a:ext cx="4854444" cy="2040293"/>
+          </a:xfrm>
+          <a:prstGeom prst="roundRect">
+            <a:avLst/>
+          </a:prstGeom>
+          <a:ln/>
+        </p:spPr>
+        <p:style>
+          <a:lnRef idx="1">
+            <a:schemeClr val="accent1"/>
+          </a:lnRef>
+          <a:fillRef idx="2">
+            <a:schemeClr val="accent1"/>
+          </a:fillRef>
+          <a:effectRef idx="1">
+            <a:schemeClr val="accent1"/>
+          </a:effectRef>
+          <a:fontRef idx="minor">
+            <a:schemeClr val="dk1"/>
+          </a:fontRef>
+        </p:style>
+        <p:txBody>
+          <a:bodyPr rot="0" spcFirstLastPara="0" vertOverflow="overflow" horzOverflow="overflow" vert="horz" wrap="square" lIns="91440" tIns="45720" rIns="91440" bIns="45720" numCol="1" spcCol="0" rtlCol="0" fromWordArt="0" anchor="ctr" anchorCtr="0" forceAA="0" compatLnSpc="1">
+            <a:prstTxWarp prst="textNoShape">
+              <a:avLst/>
+            </a:prstTxWarp>
+            <a:noAutofit/>
+          </a:bodyPr>
+          <a:lstStyle/>
+          <a:p>
+            <a:pPr algn="ctr"/>
+            <a:r>
+              <a:rPr lang="bg-BG" sz="2400" b="1" dirty="0">
+                <a:solidFill>
+                  <a:schemeClr val="tx1"/>
+                </a:solidFill>
+              </a:rPr>
+              <a:t>Този третия пакет не ни трябва!</a:t>
+            </a:r>
+          </a:p>
+          <a:p>
+            <a:pPr algn="ctr"/>
+            <a:endParaRPr lang="bg-BG" sz="2400" b="1" dirty="0">
+              <a:solidFill>
+                <a:schemeClr val="tx1"/>
+              </a:solidFill>
+            </a:endParaRPr>
+          </a:p>
+          <a:p>
+            <a:pPr algn="ctr"/>
+            <a:r>
+              <a:rPr lang="en-US" sz="2400" b="1" noProof="1">
+                <a:latin typeface="Consolas" panose="020B0609020204030204" pitchFamily="49" charset="0"/>
+              </a:rPr>
+              <a:t>Microsoft.EntityFrameworkCore.SqlServer.Design</a:t>
+            </a:r>
+            <a:endParaRPr lang="bg-BG" sz="2400" b="1" noProof="1">
+              <a:latin typeface="Consolas" panose="020B0609020204030204" pitchFamily="49" charset="0"/>
+            </a:endParaRPr>
+          </a:p>
+          <a:p>
+            <a:pPr algn="ctr"/>
+            <a:endParaRPr lang="bg-BG" sz="2400" b="1" noProof="1">
+              <a:solidFill>
+                <a:schemeClr val="tx1"/>
+              </a:solidFill>
+              <a:latin typeface="Consolas" panose="020B0609020204030204" pitchFamily="49" charset="0"/>
+            </a:endParaRPr>
+          </a:p>
+          <a:p>
+            <a:pPr algn="ctr"/>
+            <a:r>
+              <a:rPr lang="bg-BG" sz="2400" b="1" noProof="1">
+                <a:solidFill>
+                  <a:schemeClr val="tx1"/>
+                </a:solidFill>
+                <a:latin typeface="Consolas" panose="020B0609020204030204" pitchFamily="49" charset="0"/>
+              </a:rPr>
+              <a:t>Да се изтрие</a:t>
+            </a:r>
+            <a:endParaRPr lang="en-US" sz="2400" b="1" dirty="0">
+              <a:solidFill>
+                <a:schemeClr val="tx1"/>
+              </a:solidFill>
+            </a:endParaRPr>
+          </a:p>
+        </p:txBody>
+      </p:sp>
     </p:spTree>
     <p:extLst>
       <p:ext uri="{BB962C8B-B14F-4D97-AF65-F5344CB8AC3E}">
@@ -25653,6 +25756,36 @@
           </a:p>
         </p:txBody>
       </p:sp>
+      <p:pic>
+        <p:nvPicPr>
+          <p:cNvPr id="6" name="Picture 5">
+            <a:extLst>
+              <a:ext uri="{FF2B5EF4-FFF2-40B4-BE49-F238E27FC236}">
+                <a16:creationId xmlns:a16="http://schemas.microsoft.com/office/drawing/2014/main" id="{24B48A4E-9FB1-A06C-E915-6C12A1AC60EB}"/>
+              </a:ext>
+            </a:extLst>
+          </p:cNvPr>
+          <p:cNvPicPr>
+            <a:picLocks noChangeAspect="1"/>
+          </p:cNvPicPr>
+          <p:nvPr/>
+        </p:nvPicPr>
+        <p:blipFill>
+          <a:blip r:embed="rId2"/>
+          <a:stretch>
+            <a:fillRect/>
+          </a:stretch>
+        </p:blipFill>
+        <p:spPr>
+          <a:xfrm>
+            <a:off x="831000" y="2214000"/>
+            <a:ext cx="4848225" cy="2600325"/>
+          </a:xfrm>
+          <a:prstGeom prst="rect">
+            <a:avLst/>
+          </a:prstGeom>
+        </p:spPr>
+      </p:pic>
     </p:spTree>
     <p:extLst>
       <p:ext uri="{BB962C8B-B14F-4D97-AF65-F5344CB8AC3E}">
@@ -25873,6 +26006,36 @@
           </a:p>
         </p:txBody>
       </p:sp>
+      <p:pic>
+        <p:nvPicPr>
+          <p:cNvPr id="7" name="Picture 6">
+            <a:extLst>
+              <a:ext uri="{FF2B5EF4-FFF2-40B4-BE49-F238E27FC236}">
+                <a16:creationId xmlns:a16="http://schemas.microsoft.com/office/drawing/2014/main" id="{BDB737A6-BD24-5432-3135-09CC81D0B137}"/>
+              </a:ext>
+            </a:extLst>
+          </p:cNvPr>
+          <p:cNvPicPr>
+            <a:picLocks noChangeAspect="1"/>
+          </p:cNvPicPr>
+          <p:nvPr/>
+        </p:nvPicPr>
+        <p:blipFill>
+          <a:blip r:embed="rId2"/>
+          <a:stretch>
+            <a:fillRect/>
+          </a:stretch>
+        </p:blipFill>
+        <p:spPr>
+          <a:xfrm>
+            <a:off x="786000" y="314325"/>
+            <a:ext cx="4876800" cy="6229350"/>
+          </a:xfrm>
+          <a:prstGeom prst="rect">
+            <a:avLst/>
+          </a:prstGeom>
+        </p:spPr>
+      </p:pic>
     </p:spTree>
     <p:extLst>
       <p:ext uri="{BB962C8B-B14F-4D97-AF65-F5344CB8AC3E}">

</xml_diff>